<commit_message>
One more profile, documentation completed
</commit_message>
<xml_diff>
--- a/input/images-source/DeviceCatalog.pptx
+++ b/input/images-source/DeviceCatalog.pptx
@@ -197,7 +197,7 @@
           <a:p>
             <a:fld id="{C0FC2EA5-DDD9-41B5-A743-573E81829967}" type="datetimeFigureOut">
               <a:rPr lang="fr-FR" smtClean="0"/>
-              <a:t>28/01/2020</a:t>
+              <a:t>30/01/2020</a:t>
             </a:fld>
             <a:endParaRPr lang="fr-FR"/>
           </a:p>
@@ -695,7 +695,7 @@
           <a:p>
             <a:fld id="{DEBA1CB3-45B4-4365-8A01-D60AF6EBF46C}" type="datetimeFigureOut">
               <a:rPr lang="fr-FR" smtClean="0"/>
-              <a:t>28/01/2020</a:t>
+              <a:t>30/01/2020</a:t>
             </a:fld>
             <a:endParaRPr lang="fr-FR"/>
           </a:p>
@@ -893,7 +893,7 @@
           <a:p>
             <a:fld id="{DEBA1CB3-45B4-4365-8A01-D60AF6EBF46C}" type="datetimeFigureOut">
               <a:rPr lang="fr-FR" smtClean="0"/>
-              <a:t>28/01/2020</a:t>
+              <a:t>30/01/2020</a:t>
             </a:fld>
             <a:endParaRPr lang="fr-FR"/>
           </a:p>
@@ -1101,7 +1101,7 @@
           <a:p>
             <a:fld id="{DEBA1CB3-45B4-4365-8A01-D60AF6EBF46C}" type="datetimeFigureOut">
               <a:rPr lang="fr-FR" smtClean="0"/>
-              <a:t>28/01/2020</a:t>
+              <a:t>30/01/2020</a:t>
             </a:fld>
             <a:endParaRPr lang="fr-FR"/>
           </a:p>
@@ -1299,7 +1299,7 @@
           <a:p>
             <a:fld id="{DEBA1CB3-45B4-4365-8A01-D60AF6EBF46C}" type="datetimeFigureOut">
               <a:rPr lang="fr-FR" smtClean="0"/>
-              <a:t>28/01/2020</a:t>
+              <a:t>30/01/2020</a:t>
             </a:fld>
             <a:endParaRPr lang="fr-FR"/>
           </a:p>
@@ -1574,7 +1574,7 @@
           <a:p>
             <a:fld id="{DEBA1CB3-45B4-4365-8A01-D60AF6EBF46C}" type="datetimeFigureOut">
               <a:rPr lang="fr-FR" smtClean="0"/>
-              <a:t>28/01/2020</a:t>
+              <a:t>30/01/2020</a:t>
             </a:fld>
             <a:endParaRPr lang="fr-FR"/>
           </a:p>
@@ -1839,7 +1839,7 @@
           <a:p>
             <a:fld id="{DEBA1CB3-45B4-4365-8A01-D60AF6EBF46C}" type="datetimeFigureOut">
               <a:rPr lang="fr-FR" smtClean="0"/>
-              <a:t>28/01/2020</a:t>
+              <a:t>30/01/2020</a:t>
             </a:fld>
             <a:endParaRPr lang="fr-FR"/>
           </a:p>
@@ -2251,7 +2251,7 @@
           <a:p>
             <a:fld id="{DEBA1CB3-45B4-4365-8A01-D60AF6EBF46C}" type="datetimeFigureOut">
               <a:rPr lang="fr-FR" smtClean="0"/>
-              <a:t>28/01/2020</a:t>
+              <a:t>30/01/2020</a:t>
             </a:fld>
             <a:endParaRPr lang="fr-FR"/>
           </a:p>
@@ -2392,7 +2392,7 @@
           <a:p>
             <a:fld id="{DEBA1CB3-45B4-4365-8A01-D60AF6EBF46C}" type="datetimeFigureOut">
               <a:rPr lang="fr-FR" smtClean="0"/>
-              <a:t>28/01/2020</a:t>
+              <a:t>30/01/2020</a:t>
             </a:fld>
             <a:endParaRPr lang="fr-FR"/>
           </a:p>
@@ -2505,7 +2505,7 @@
           <a:p>
             <a:fld id="{DEBA1CB3-45B4-4365-8A01-D60AF6EBF46C}" type="datetimeFigureOut">
               <a:rPr lang="fr-FR" smtClean="0"/>
-              <a:t>28/01/2020</a:t>
+              <a:t>30/01/2020</a:t>
             </a:fld>
             <a:endParaRPr lang="fr-FR"/>
           </a:p>
@@ -2816,7 +2816,7 @@
           <a:p>
             <a:fld id="{DEBA1CB3-45B4-4365-8A01-D60AF6EBF46C}" type="datetimeFigureOut">
               <a:rPr lang="fr-FR" smtClean="0"/>
-              <a:t>28/01/2020</a:t>
+              <a:t>30/01/2020</a:t>
             </a:fld>
             <a:endParaRPr lang="fr-FR"/>
           </a:p>
@@ -3104,7 +3104,7 @@
           <a:p>
             <a:fld id="{DEBA1CB3-45B4-4365-8A01-D60AF6EBF46C}" type="datetimeFigureOut">
               <a:rPr lang="fr-FR" smtClean="0"/>
-              <a:t>28/01/2020</a:t>
+              <a:t>30/01/2020</a:t>
             </a:fld>
             <a:endParaRPr lang="fr-FR"/>
           </a:p>
@@ -3345,7 +3345,7 @@
           <a:p>
             <a:fld id="{DEBA1CB3-45B4-4365-8A01-D60AF6EBF46C}" type="datetimeFigureOut">
               <a:rPr lang="fr-FR" smtClean="0"/>
-              <a:t>28/01/2020</a:t>
+              <a:t>30/01/2020</a:t>
             </a:fld>
             <a:endParaRPr lang="fr-FR"/>
           </a:p>
@@ -4008,7 +4008,7 @@
           <a:p>
             <a:pPr algn="ctr"/>
             <a:r>
-              <a:rPr lang="en-US" noProof="1">
+              <a:rPr lang="en-US" i="1" noProof="1">
                 <a:solidFill>
                   <a:schemeClr val="accent1">
                     <a:lumMod val="60000"/>
@@ -4064,7 +4064,7 @@
           </a:lstStyle>
           <a:p>
             <a:r>
-              <a:rPr lang="en-US" noProof="1"/>
+              <a:rPr lang="en-US" i="1" noProof="1"/>
               <a:t>A device</a:t>
             </a:r>
           </a:p>

</xml_diff>

<commit_message>
Ballot comments on CatalogHeader and LabServiceDefinition+ Device image
</commit_message>
<xml_diff>
--- a/input/images-source/DeviceCatalog.pptx
+++ b/input/images-source/DeviceCatalog.pptx
@@ -197,7 +197,7 @@
           <a:p>
             <a:fld id="{C0FC2EA5-DDD9-41B5-A743-573E81829967}" type="datetimeFigureOut">
               <a:rPr lang="fr-FR" smtClean="0"/>
-              <a:t>04/12/2020</a:t>
+              <a:t>18/12/2020</a:t>
             </a:fld>
             <a:endParaRPr lang="fr-FR"/>
           </a:p>
@@ -695,7 +695,7 @@
           <a:p>
             <a:fld id="{DEBA1CB3-45B4-4365-8A01-D60AF6EBF46C}" type="datetimeFigureOut">
               <a:rPr lang="fr-FR" smtClean="0"/>
-              <a:t>04/12/2020</a:t>
+              <a:t>18/12/2020</a:t>
             </a:fld>
             <a:endParaRPr lang="fr-FR"/>
           </a:p>
@@ -893,7 +893,7 @@
           <a:p>
             <a:fld id="{DEBA1CB3-45B4-4365-8A01-D60AF6EBF46C}" type="datetimeFigureOut">
               <a:rPr lang="fr-FR" smtClean="0"/>
-              <a:t>04/12/2020</a:t>
+              <a:t>18/12/2020</a:t>
             </a:fld>
             <a:endParaRPr lang="fr-FR"/>
           </a:p>
@@ -1101,7 +1101,7 @@
           <a:p>
             <a:fld id="{DEBA1CB3-45B4-4365-8A01-D60AF6EBF46C}" type="datetimeFigureOut">
               <a:rPr lang="fr-FR" smtClean="0"/>
-              <a:t>04/12/2020</a:t>
+              <a:t>18/12/2020</a:t>
             </a:fld>
             <a:endParaRPr lang="fr-FR"/>
           </a:p>
@@ -1299,7 +1299,7 @@
           <a:p>
             <a:fld id="{DEBA1CB3-45B4-4365-8A01-D60AF6EBF46C}" type="datetimeFigureOut">
               <a:rPr lang="fr-FR" smtClean="0"/>
-              <a:t>04/12/2020</a:t>
+              <a:t>18/12/2020</a:t>
             </a:fld>
             <a:endParaRPr lang="fr-FR"/>
           </a:p>
@@ -1574,7 +1574,7 @@
           <a:p>
             <a:fld id="{DEBA1CB3-45B4-4365-8A01-D60AF6EBF46C}" type="datetimeFigureOut">
               <a:rPr lang="fr-FR" smtClean="0"/>
-              <a:t>04/12/2020</a:t>
+              <a:t>18/12/2020</a:t>
             </a:fld>
             <a:endParaRPr lang="fr-FR"/>
           </a:p>
@@ -1839,7 +1839,7 @@
           <a:p>
             <a:fld id="{DEBA1CB3-45B4-4365-8A01-D60AF6EBF46C}" type="datetimeFigureOut">
               <a:rPr lang="fr-FR" smtClean="0"/>
-              <a:t>04/12/2020</a:t>
+              <a:t>18/12/2020</a:t>
             </a:fld>
             <a:endParaRPr lang="fr-FR"/>
           </a:p>
@@ -2251,7 +2251,7 @@
           <a:p>
             <a:fld id="{DEBA1CB3-45B4-4365-8A01-D60AF6EBF46C}" type="datetimeFigureOut">
               <a:rPr lang="fr-FR" smtClean="0"/>
-              <a:t>04/12/2020</a:t>
+              <a:t>18/12/2020</a:t>
             </a:fld>
             <a:endParaRPr lang="fr-FR"/>
           </a:p>
@@ -2392,7 +2392,7 @@
           <a:p>
             <a:fld id="{DEBA1CB3-45B4-4365-8A01-D60AF6EBF46C}" type="datetimeFigureOut">
               <a:rPr lang="fr-FR" smtClean="0"/>
-              <a:t>04/12/2020</a:t>
+              <a:t>18/12/2020</a:t>
             </a:fld>
             <a:endParaRPr lang="fr-FR"/>
           </a:p>
@@ -2505,7 +2505,7 @@
           <a:p>
             <a:fld id="{DEBA1CB3-45B4-4365-8A01-D60AF6EBF46C}" type="datetimeFigureOut">
               <a:rPr lang="fr-FR" smtClean="0"/>
-              <a:t>04/12/2020</a:t>
+              <a:t>18/12/2020</a:t>
             </a:fld>
             <a:endParaRPr lang="fr-FR"/>
           </a:p>
@@ -2816,7 +2816,7 @@
           <a:p>
             <a:fld id="{DEBA1CB3-45B4-4365-8A01-D60AF6EBF46C}" type="datetimeFigureOut">
               <a:rPr lang="fr-FR" smtClean="0"/>
-              <a:t>04/12/2020</a:t>
+              <a:t>18/12/2020</a:t>
             </a:fld>
             <a:endParaRPr lang="fr-FR"/>
           </a:p>
@@ -3104,7 +3104,7 @@
           <a:p>
             <a:fld id="{DEBA1CB3-45B4-4365-8A01-D60AF6EBF46C}" type="datetimeFigureOut">
               <a:rPr lang="fr-FR" smtClean="0"/>
-              <a:t>04/12/2020</a:t>
+              <a:t>18/12/2020</a:t>
             </a:fld>
             <a:endParaRPr lang="fr-FR"/>
           </a:p>
@@ -3345,7 +3345,7 @@
           <a:p>
             <a:fld id="{DEBA1CB3-45B4-4365-8A01-D60AF6EBF46C}" type="datetimeFigureOut">
               <a:rPr lang="fr-FR" smtClean="0"/>
-              <a:t>04/12/2020</a:t>
+              <a:t>18/12/2020</a:t>
             </a:fld>
             <a:endParaRPr lang="fr-FR"/>
           </a:p>
@@ -3776,8 +3776,8 @@
         </p:nvSpPr>
         <p:spPr>
           <a:xfrm>
-            <a:off x="685803" y="2892823"/>
-            <a:ext cx="2804666" cy="368227"/>
+            <a:off x="5145945" y="2496238"/>
+            <a:ext cx="1428357" cy="646331"/>
           </a:xfrm>
           <a:prstGeom prst="rect">
             <a:avLst/>
@@ -3804,9 +3804,13 @@
             </a:lvl1pPr>
           </a:lstStyle>
           <a:p>
-            <a:pPr algn="r"/>
-            <a:r>
-              <a:rPr lang="en-US" i="1" noProof="1"/>
+            <a:pPr algn="ctr"/>
+            <a:r>
+              <a:rPr lang="en-US" i="1" noProof="1">
+                <a:solidFill>
+                  <a:schemeClr val="tx1"/>
+                </a:solidFill>
+              </a:rPr>
               <a:t>A medical device</a:t>
             </a:r>
           </a:p>
@@ -3826,7 +3830,7 @@
         </p:nvSpPr>
         <p:spPr>
           <a:xfrm>
-            <a:off x="4568663" y="2552821"/>
+            <a:off x="5582446" y="3129287"/>
             <a:ext cx="340999" cy="196994"/>
           </a:xfrm>
           <a:prstGeom prst="rect">
@@ -3872,7 +3876,7 @@
         </p:nvSpPr>
         <p:spPr>
           <a:xfrm>
-            <a:off x="5120629" y="2552821"/>
+            <a:off x="6134412" y="3129287"/>
             <a:ext cx="340999" cy="196994"/>
           </a:xfrm>
           <a:prstGeom prst="rect">
@@ -3918,7 +3922,7 @@
         </p:nvSpPr>
         <p:spPr>
           <a:xfrm>
-            <a:off x="6039038" y="2588856"/>
+            <a:off x="7052821" y="3165322"/>
             <a:ext cx="340999" cy="324520"/>
           </a:xfrm>
           <a:prstGeom prst="rect">
@@ -3964,7 +3968,7 @@
         </p:nvSpPr>
         <p:spPr>
           <a:xfrm>
-            <a:off x="6049552" y="3341055"/>
+            <a:off x="7063335" y="3917521"/>
             <a:ext cx="340999" cy="324520"/>
           </a:xfrm>
           <a:prstGeom prst="rect">
@@ -4014,7 +4018,7 @@
         </p:nvCxnSpPr>
         <p:spPr>
           <a:xfrm rot="16200000" flipH="1">
-            <a:off x="6213657" y="2584737"/>
+            <a:off x="7227440" y="3161203"/>
             <a:ext cx="162260" cy="170499"/>
           </a:xfrm>
           <a:prstGeom prst="bentConnector4">
@@ -4057,8 +4061,8 @@
         </p:nvSpPr>
         <p:spPr>
           <a:xfrm>
-            <a:off x="6569199" y="2272905"/>
-            <a:ext cx="1496240" cy="369332"/>
+            <a:off x="7582981" y="2849371"/>
+            <a:ext cx="3429569" cy="369332"/>
           </a:xfrm>
           <a:prstGeom prst="rect">
             <a:avLst/>
@@ -4073,7 +4077,11 @@
           <a:p>
             <a:r>
               <a:rPr lang="en-US" noProof="1"/>
-              <a:t>parentDevice</a:t>
+              <a:t>parentDevice </a:t>
+            </a:r>
+            <a:r>
+              <a:rPr lang="en-US" i="1" noProof="1"/>
+              <a:t>(is part of)</a:t>
             </a:r>
           </a:p>
         </p:txBody>
@@ -4092,7 +4100,7 @@
         </p:nvSpPr>
         <p:spPr>
           <a:xfrm>
-            <a:off x="3651352" y="3335042"/>
+            <a:off x="4665135" y="3898256"/>
             <a:ext cx="539154" cy="324520"/>
           </a:xfrm>
           <a:prstGeom prst="rect">
@@ -4138,7 +4146,7 @@
         </p:nvSpPr>
         <p:spPr>
           <a:xfrm>
-            <a:off x="6687772" y="2545899"/>
+            <a:off x="7701555" y="3122365"/>
             <a:ext cx="607145" cy="369332"/>
           </a:xfrm>
           <a:prstGeom prst="rect">
@@ -4173,8 +4181,8 @@
         </p:nvSpPr>
         <p:spPr>
           <a:xfrm>
-            <a:off x="9574236" y="3898566"/>
-            <a:ext cx="2233710" cy="695103"/>
+            <a:off x="9708507" y="4478458"/>
+            <a:ext cx="1994629" cy="695103"/>
           </a:xfrm>
           <a:prstGeom prst="rect">
             <a:avLst/>
@@ -4237,7 +4245,7 @@
           <a:p>
             <a:pPr algn="ctr"/>
             <a:r>
-              <a:rPr lang="en-US" sz="2400" noProof="1">
+              <a:rPr lang="en-US" sz="2000" noProof="1">
                 <a:solidFill>
                   <a:schemeClr val="bg1"/>
                 </a:solidFill>
@@ -4265,8 +4273,8 @@
         </p:nvCxnSpPr>
         <p:spPr>
           <a:xfrm>
-            <a:off x="6390551" y="3503315"/>
-            <a:ext cx="4300540" cy="395251"/>
+            <a:off x="7404334" y="4079781"/>
+            <a:ext cx="3301488" cy="398677"/>
           </a:xfrm>
           <a:prstGeom prst="bentConnector2">
             <a:avLst/>
@@ -4305,7 +4313,7 @@
         </p:nvSpPr>
         <p:spPr>
           <a:xfrm>
-            <a:off x="10742920" y="3476113"/>
+            <a:off x="10742920" y="4052579"/>
             <a:ext cx="578339" cy="369332"/>
           </a:xfrm>
           <a:prstGeom prst="rect">
@@ -4340,8 +4348,8 @@
         </p:nvSpPr>
         <p:spPr>
           <a:xfrm>
-            <a:off x="6380037" y="3127544"/>
-            <a:ext cx="4591483" cy="369332"/>
+            <a:off x="7890117" y="3764691"/>
+            <a:ext cx="2160248" cy="369332"/>
           </a:xfrm>
           <a:prstGeom prst="rect">
             <a:avLst/>
@@ -4355,8 +4363,12 @@
           <a:lstStyle/>
           <a:p>
             <a:r>
-              <a:rPr lang="en-US" noProof="1"/>
-              <a:t>extensions (indication and/or contraindication)</a:t>
+              <a:rPr lang="en-US" noProof="1">
+                <a:solidFill>
+                  <a:srgbClr val="0070C0"/>
+                </a:solidFill>
+              </a:rPr>
+              <a:t>Guideline extension</a:t>
             </a:r>
           </a:p>
         </p:txBody>
@@ -4375,8 +4387,8 @@
         </p:nvSpPr>
         <p:spPr>
           <a:xfrm>
-            <a:off x="3976722" y="5258036"/>
-            <a:ext cx="2056722" cy="930160"/>
+            <a:off x="4997131" y="6041784"/>
+            <a:ext cx="2056722" cy="695103"/>
           </a:xfrm>
           <a:prstGeom prst="rect">
             <a:avLst/>
@@ -4439,7 +4451,7 @@
           <a:p>
             <a:pPr algn="ctr"/>
             <a:r>
-              <a:rPr lang="en-US" sz="2400" noProof="1">
+              <a:rPr lang="en-US" sz="2000" noProof="1">
                 <a:solidFill>
                   <a:schemeClr val="bg1"/>
                 </a:solidFill>
@@ -4466,9 +4478,9 @@
           <p:nvPr/>
         </p:nvCxnSpPr>
         <p:spPr>
-          <a:xfrm rot="5400000">
-            <a:off x="4220874" y="4468491"/>
-            <a:ext cx="1573754" cy="5336"/>
+          <a:xfrm rot="16200000" flipH="1">
+            <a:off x="5134329" y="5150621"/>
+            <a:ext cx="1781036" cy="1290"/>
           </a:xfrm>
           <a:prstGeom prst="bentConnector3">
             <a:avLst>
@@ -4509,7 +4521,7 @@
         </p:nvSpPr>
         <p:spPr>
           <a:xfrm>
-            <a:off x="2617101" y="3700078"/>
+            <a:off x="5980935" y="4321363"/>
             <a:ext cx="2568699" cy="369332"/>
           </a:xfrm>
           <a:prstGeom prst="rect">
@@ -4524,7 +4536,11 @@
           <a:lstStyle/>
           <a:p>
             <a:r>
-              <a:rPr lang="en-US" noProof="1"/>
+              <a:rPr lang="en-US" noProof="1">
+                <a:solidFill>
+                  <a:srgbClr val="0070C0"/>
+                </a:solidFill>
+              </a:rPr>
               <a:t>manufacturerReference</a:t>
             </a:r>
           </a:p>
@@ -4544,7 +4560,7 @@
         </p:nvSpPr>
         <p:spPr>
           <a:xfrm>
-            <a:off x="4426743" y="4901835"/>
+            <a:off x="5445863" y="5686245"/>
             <a:ext cx="578339" cy="369332"/>
           </a:xfrm>
           <a:prstGeom prst="rect">
@@ -4579,7 +4595,7 @@
         </p:nvSpPr>
         <p:spPr>
           <a:xfrm>
-            <a:off x="2038673" y="1651952"/>
+            <a:off x="2038673" y="1347156"/>
             <a:ext cx="661288" cy="369332"/>
           </a:xfrm>
           <a:prstGeom prst="rect">
@@ -4618,8 +4634,8 @@
         </p:nvCxnSpPr>
         <p:spPr>
           <a:xfrm rot="16200000" flipV="1">
-            <a:off x="2887029" y="1351713"/>
-            <a:ext cx="922647" cy="1479569"/>
+            <a:off x="2953289" y="980656"/>
+            <a:ext cx="1803908" cy="2493352"/>
           </a:xfrm>
           <a:prstGeom prst="bentConnector3">
             <a:avLst>
@@ -4660,7 +4676,7 @@
         </p:nvSpPr>
         <p:spPr>
           <a:xfrm>
-            <a:off x="1472666" y="413886"/>
+            <a:off x="1472666" y="109090"/>
             <a:ext cx="2271802" cy="1216288"/>
           </a:xfrm>
           <a:prstGeom prst="rect">
@@ -4705,7 +4721,7 @@
           <a:p>
             <a:pPr algn="ctr"/>
             <a:r>
-              <a:rPr lang="en-US" sz="2400" noProof="1">
+              <a:rPr lang="en-US" sz="2000" noProof="1">
                 <a:solidFill>
                   <a:srgbClr val="FFFF00"/>
                 </a:solidFill>
@@ -4729,7 +4745,7 @@
         </p:nvSpPr>
         <p:spPr>
           <a:xfrm>
-            <a:off x="2496889" y="1744461"/>
+            <a:off x="2496889" y="1439665"/>
             <a:ext cx="1930294" cy="369332"/>
           </a:xfrm>
           <a:prstGeom prst="rect">
@@ -4769,7 +4785,7 @@
         </p:nvSpPr>
         <p:spPr>
           <a:xfrm>
-            <a:off x="-45223" y="448754"/>
+            <a:off x="-26095" y="109090"/>
             <a:ext cx="1462050" cy="1200329"/>
           </a:xfrm>
           <a:prstGeom prst="rect">
@@ -4805,7 +4821,7 @@
         </p:nvSpPr>
         <p:spPr>
           <a:xfrm>
-            <a:off x="6783709" y="413886"/>
+            <a:off x="7916768" y="109090"/>
             <a:ext cx="2213695" cy="1270066"/>
           </a:xfrm>
           <a:prstGeom prst="rect">
@@ -4850,7 +4866,7 @@
           <a:p>
             <a:pPr algn="ctr"/>
             <a:r>
-              <a:rPr lang="en-US" sz="2400" noProof="1">
+              <a:rPr lang="en-US" sz="2000" noProof="1">
                 <a:solidFill>
                   <a:srgbClr val="FFFF00"/>
                 </a:solidFill>
@@ -4878,12 +4894,12 @@
         </p:nvCxnSpPr>
         <p:spPr>
           <a:xfrm rot="5400000" flipH="1" flipV="1">
-            <a:off x="6347142" y="1009406"/>
-            <a:ext cx="868869" cy="2217962"/>
+            <a:off x="7099200" y="1204871"/>
+            <a:ext cx="1750131" cy="2098702"/>
           </a:xfrm>
           <a:prstGeom prst="bentConnector3">
             <a:avLst>
-              <a:gd name="adj1" fmla="val 50000"/>
+              <a:gd name="adj1" fmla="val 74231"/>
             </a:avLst>
           </a:prstGeom>
           <a:ln w="19050">
@@ -4920,7 +4936,7 @@
         </p:nvSpPr>
         <p:spPr>
           <a:xfrm>
-            <a:off x="5153822" y="2180974"/>
+            <a:off x="6446519" y="2777973"/>
             <a:ext cx="610436" cy="369332"/>
           </a:xfrm>
           <a:prstGeom prst="rect">
@@ -4955,7 +4971,7 @@
         </p:nvSpPr>
         <p:spPr>
           <a:xfrm>
-            <a:off x="8997404" y="587254"/>
+            <a:off x="10130463" y="282458"/>
             <a:ext cx="2045840" cy="923330"/>
           </a:xfrm>
           <a:prstGeom prst="rect">
@@ -4990,7 +5006,7 @@
         </p:nvSpPr>
         <p:spPr>
           <a:xfrm>
-            <a:off x="6499393" y="1751834"/>
+            <a:off x="7632452" y="1447038"/>
             <a:ext cx="1566041" cy="369332"/>
           </a:xfrm>
           <a:prstGeom prst="rect">
@@ -5017,10 +5033,10 @@
       </p:sp>
       <p:sp>
         <p:nvSpPr>
-          <p:cNvPr id="17" name="Rectangle 16">
-            <a:extLst>
-              <a:ext uri="{FF2B5EF4-FFF2-40B4-BE49-F238E27FC236}">
-                <a16:creationId xmlns:a16="http://schemas.microsoft.com/office/drawing/2014/main" id="{E989523E-2435-438C-B1CA-FBD07084180E}"/>
+          <p:cNvPr id="57" name="Rectangle 56">
+            <a:extLst>
+              <a:ext uri="{FF2B5EF4-FFF2-40B4-BE49-F238E27FC236}">
+                <a16:creationId xmlns:a16="http://schemas.microsoft.com/office/drawing/2014/main" id="{E55DC401-764A-4F06-AE91-26F204CC7A94}"/>
               </a:ext>
             </a:extLst>
           </p:cNvPr>
@@ -5029,7 +5045,7 @@
         </p:nvSpPr>
         <p:spPr>
           <a:xfrm>
-            <a:off x="3976722" y="2552821"/>
+            <a:off x="6813500" y="3129287"/>
             <a:ext cx="222828" cy="196994"/>
           </a:xfrm>
           <a:prstGeom prst="rect">
@@ -5063,10 +5079,10 @@
       </p:sp>
       <p:sp>
         <p:nvSpPr>
-          <p:cNvPr id="57" name="Rectangle 56">
-            <a:extLst>
-              <a:ext uri="{FF2B5EF4-FFF2-40B4-BE49-F238E27FC236}">
-                <a16:creationId xmlns:a16="http://schemas.microsoft.com/office/drawing/2014/main" id="{E55DC401-764A-4F06-AE91-26F204CC7A94}"/>
+          <p:cNvPr id="32" name="Rectangle 31">
+            <a:extLst>
+              <a:ext uri="{FF2B5EF4-FFF2-40B4-BE49-F238E27FC236}">
+                <a16:creationId xmlns:a16="http://schemas.microsoft.com/office/drawing/2014/main" id="{F8DDAFC6-8889-41A5-A980-EAAB08538619}"/>
               </a:ext>
             </a:extLst>
           </p:cNvPr>
@@ -5075,54 +5091,8 @@
         </p:nvSpPr>
         <p:spPr>
           <a:xfrm>
-            <a:off x="5561181" y="2552821"/>
-            <a:ext cx="222828" cy="196994"/>
-          </a:xfrm>
-          <a:prstGeom prst="rect">
-            <a:avLst/>
-          </a:prstGeom>
-        </p:spPr>
-        <p:style>
-          <a:lnRef idx="2">
-            <a:schemeClr val="accent1">
-              <a:shade val="50000"/>
-            </a:schemeClr>
-          </a:lnRef>
-          <a:fillRef idx="1">
-            <a:schemeClr val="accent1"/>
-          </a:fillRef>
-          <a:effectRef idx="0">
-            <a:schemeClr val="accent1"/>
-          </a:effectRef>
-          <a:fontRef idx="minor">
-            <a:schemeClr val="lt1"/>
-          </a:fontRef>
-        </p:style>
-        <p:txBody>
-          <a:bodyPr rtlCol="0" anchor="ctr"/>
-          <a:lstStyle/>
-          <a:p>
-            <a:pPr algn="ctr"/>
-            <a:endParaRPr lang="fr-FR"/>
-          </a:p>
-        </p:txBody>
-      </p:sp>
-      <p:sp>
-        <p:nvSpPr>
-          <p:cNvPr id="11" name="Rectangle 10">
-            <a:extLst>
-              <a:ext uri="{FF2B5EF4-FFF2-40B4-BE49-F238E27FC236}">
-                <a16:creationId xmlns:a16="http://schemas.microsoft.com/office/drawing/2014/main" id="{E2B1908B-CC45-41BD-BE20-7F25C0BD8D17}"/>
-              </a:ext>
-            </a:extLst>
-          </p:cNvPr>
-          <p:cNvSpPr/>
-          <p:nvPr/>
-        </p:nvSpPr>
-        <p:spPr>
-          <a:xfrm>
-            <a:off x="3622139" y="2543740"/>
-            <a:ext cx="2776560" cy="1140542"/>
+            <a:off x="9956362" y="6038871"/>
+            <a:ext cx="1493515" cy="695103"/>
           </a:xfrm>
           <a:prstGeom prst="rect">
             <a:avLst/>
@@ -5185,23 +5155,735 @@
           <a:p>
             <a:pPr algn="ctr"/>
             <a:r>
-              <a:rPr lang="en-US" sz="2400" noProof="1">
+              <a:rPr lang="en-US" sz="2000" noProof="1">
                 <a:solidFill>
                   <a:schemeClr val="bg1"/>
                 </a:solidFill>
               </a:rPr>
-              <a:t>MDDefinition</a:t>
-            </a:r>
-          </a:p>
+              <a:t>Observation</a:t>
+            </a:r>
+          </a:p>
+        </p:txBody>
+      </p:sp>
+      <p:cxnSp>
+        <p:nvCxnSpPr>
+          <p:cNvPr id="33" name="Connecteur : en angle 32">
+            <a:extLst>
+              <a:ext uri="{FF2B5EF4-FFF2-40B4-BE49-F238E27FC236}">
+                <a16:creationId xmlns:a16="http://schemas.microsoft.com/office/drawing/2014/main" id="{06E99D9A-F33A-4023-98C9-570C2B78D1C9}"/>
+              </a:ext>
+            </a:extLst>
+          </p:cNvPr>
+          <p:cNvCxnSpPr>
+            <a:cxnSpLocks/>
+            <a:stCxn id="79" idx="2"/>
+            <a:endCxn id="32" idx="0"/>
+          </p:cNvCxnSpPr>
+          <p:nvPr/>
+        </p:nvCxnSpPr>
+        <p:spPr>
+          <a:xfrm rot="5400000">
+            <a:off x="10271816" y="5604865"/>
+            <a:ext cx="865310" cy="2702"/>
+          </a:xfrm>
+          <a:prstGeom prst="bentConnector3">
+            <a:avLst>
+              <a:gd name="adj1" fmla="val 50000"/>
+            </a:avLst>
+          </a:prstGeom>
+          <a:ln w="28575">
+            <a:headEnd type="none" w="med" len="med"/>
+            <a:tailEnd type="arrow" w="med" len="med"/>
+          </a:ln>
+        </p:spPr>
+        <p:style>
+          <a:lnRef idx="1">
+            <a:schemeClr val="accent1"/>
+          </a:lnRef>
+          <a:fillRef idx="0">
+            <a:schemeClr val="accent1"/>
+          </a:fillRef>
+          <a:effectRef idx="0">
+            <a:schemeClr val="accent1"/>
+          </a:effectRef>
+          <a:fontRef idx="minor">
+            <a:schemeClr val="tx1"/>
+          </a:fontRef>
+        </p:style>
+      </p:cxnSp>
+      <p:sp>
+        <p:nvSpPr>
+          <p:cNvPr id="42" name="ZoneTexte 41">
+            <a:extLst>
+              <a:ext uri="{FF2B5EF4-FFF2-40B4-BE49-F238E27FC236}">
+                <a16:creationId xmlns:a16="http://schemas.microsoft.com/office/drawing/2014/main" id="{ED75D7F4-418B-4EE7-8C91-B426DF662924}"/>
+              </a:ext>
+            </a:extLst>
+          </p:cNvPr>
+          <p:cNvSpPr txBox="1"/>
+          <p:nvPr/>
+        </p:nvSpPr>
+        <p:spPr>
+          <a:xfrm>
+            <a:off x="10693814" y="5173561"/>
+            <a:ext cx="1206345" cy="369332"/>
+          </a:xfrm>
+          <a:prstGeom prst="rect">
+            <a:avLst/>
+          </a:prstGeom>
+          <a:noFill/>
+        </p:spPr>
+        <p:txBody>
+          <a:bodyPr wrap="square" rtlCol="0">
+            <a:spAutoFit/>
+          </a:bodyPr>
+          <a:lstStyle/>
+          <a:p>
+            <a:r>
+              <a:rPr lang="en-US" noProof="1">
+                <a:solidFill>
+                  <a:srgbClr val="0070C0"/>
+                </a:solidFill>
+              </a:rPr>
+              <a:t>extension</a:t>
+            </a:r>
+          </a:p>
+        </p:txBody>
+      </p:sp>
+      <p:sp>
+        <p:nvSpPr>
+          <p:cNvPr id="45" name="ZoneTexte 44">
+            <a:extLst>
+              <a:ext uri="{FF2B5EF4-FFF2-40B4-BE49-F238E27FC236}">
+                <a16:creationId xmlns:a16="http://schemas.microsoft.com/office/drawing/2014/main" id="{07DBE21F-8FE0-4F67-B02E-C0F97E28852C}"/>
+              </a:ext>
+            </a:extLst>
+          </p:cNvPr>
+          <p:cNvSpPr txBox="1"/>
+          <p:nvPr/>
+        </p:nvSpPr>
+        <p:spPr>
+          <a:xfrm>
+            <a:off x="10693814" y="5669539"/>
+            <a:ext cx="578339" cy="369332"/>
+          </a:xfrm>
+          <a:prstGeom prst="rect">
+            <a:avLst/>
+          </a:prstGeom>
+          <a:noFill/>
+        </p:spPr>
+        <p:txBody>
+          <a:bodyPr wrap="square" rtlCol="0">
+            <a:spAutoFit/>
+          </a:bodyPr>
+          <a:lstStyle/>
+          <a:p>
+            <a:r>
+              <a:rPr lang="en-US" noProof="1"/>
+              <a:t>0..*</a:t>
+            </a:r>
+          </a:p>
+        </p:txBody>
+      </p:sp>
+      <p:sp>
+        <p:nvSpPr>
+          <p:cNvPr id="48" name="Rectangle 47">
+            <a:extLst>
+              <a:ext uri="{FF2B5EF4-FFF2-40B4-BE49-F238E27FC236}">
+                <a16:creationId xmlns:a16="http://schemas.microsoft.com/office/drawing/2014/main" id="{84593E0E-7660-4421-8039-B990407D625F}"/>
+              </a:ext>
+            </a:extLst>
+          </p:cNvPr>
+          <p:cNvSpPr/>
+          <p:nvPr/>
+        </p:nvSpPr>
+        <p:spPr>
+          <a:xfrm>
+            <a:off x="4643485" y="3925520"/>
+            <a:ext cx="340999" cy="324520"/>
+          </a:xfrm>
+          <a:prstGeom prst="rect">
+            <a:avLst/>
+          </a:prstGeom>
+        </p:spPr>
+        <p:style>
+          <a:lnRef idx="2">
+            <a:schemeClr val="accent1">
+              <a:shade val="50000"/>
+            </a:schemeClr>
+          </a:lnRef>
+          <a:fillRef idx="1">
+            <a:schemeClr val="accent1"/>
+          </a:fillRef>
+          <a:effectRef idx="0">
+            <a:schemeClr val="accent1"/>
+          </a:effectRef>
+          <a:fontRef idx="minor">
+            <a:schemeClr val="lt1"/>
+          </a:fontRef>
+        </p:style>
+        <p:txBody>
+          <a:bodyPr rtlCol="0" anchor="ctr"/>
+          <a:lstStyle/>
           <a:p>
             <a:pPr algn="ctr"/>
-            <a:r>
-              <a:rPr lang="en-US" sz="2400" noProof="1">
+            <a:endParaRPr lang="fr-FR"/>
+          </a:p>
+        </p:txBody>
+      </p:sp>
+      <p:cxnSp>
+        <p:nvCxnSpPr>
+          <p:cNvPr id="49" name="Connecteur : en angle 48">
+            <a:extLst>
+              <a:ext uri="{FF2B5EF4-FFF2-40B4-BE49-F238E27FC236}">
+                <a16:creationId xmlns:a16="http://schemas.microsoft.com/office/drawing/2014/main" id="{FD63C80E-988B-4680-A687-CF845F4FFCCA}"/>
+              </a:ext>
+            </a:extLst>
+          </p:cNvPr>
+          <p:cNvCxnSpPr>
+            <a:cxnSpLocks/>
+            <a:stCxn id="48" idx="1"/>
+            <a:endCxn id="50" idx="0"/>
+          </p:cNvCxnSpPr>
+          <p:nvPr/>
+        </p:nvCxnSpPr>
+        <p:spPr>
+          <a:xfrm rot="10800000" flipV="1">
+            <a:off x="2585553" y="4087780"/>
+            <a:ext cx="2057932" cy="692048"/>
+          </a:xfrm>
+          <a:prstGeom prst="bentConnector2">
+            <a:avLst/>
+          </a:prstGeom>
+          <a:ln w="28575">
+            <a:headEnd type="none" w="med" len="med"/>
+            <a:tailEnd type="arrow" w="med" len="med"/>
+          </a:ln>
+        </p:spPr>
+        <p:style>
+          <a:lnRef idx="1">
+            <a:schemeClr val="accent1"/>
+          </a:lnRef>
+          <a:fillRef idx="0">
+            <a:schemeClr val="accent1"/>
+          </a:fillRef>
+          <a:effectRef idx="0">
+            <a:schemeClr val="accent1"/>
+          </a:effectRef>
+          <a:fontRef idx="minor">
+            <a:schemeClr val="tx1"/>
+          </a:fontRef>
+        </p:style>
+      </p:cxnSp>
+      <p:sp>
+        <p:nvSpPr>
+          <p:cNvPr id="50" name="Rectangle 49">
+            <a:extLst>
+              <a:ext uri="{FF2B5EF4-FFF2-40B4-BE49-F238E27FC236}">
+                <a16:creationId xmlns:a16="http://schemas.microsoft.com/office/drawing/2014/main" id="{8DE433AB-BAA4-4305-B1E7-470CA2B05998}"/>
+              </a:ext>
+            </a:extLst>
+          </p:cNvPr>
+          <p:cNvSpPr/>
+          <p:nvPr/>
+        </p:nvSpPr>
+        <p:spPr>
+          <a:xfrm>
+            <a:off x="1828800" y="4779828"/>
+            <a:ext cx="1513505" cy="792704"/>
+          </a:xfrm>
+          <a:prstGeom prst="rect">
+            <a:avLst/>
+          </a:prstGeom>
+          <a:gradFill flip="none" rotWithShape="1">
+            <a:gsLst>
+              <a:gs pos="0">
+                <a:schemeClr val="accent1">
+                  <a:shade val="30000"/>
+                  <a:satMod val="115000"/>
+                </a:schemeClr>
+              </a:gs>
+              <a:gs pos="50000">
+                <a:schemeClr val="accent1">
+                  <a:shade val="67500"/>
+                  <a:satMod val="115000"/>
+                </a:schemeClr>
+              </a:gs>
+              <a:gs pos="100000">
+                <a:schemeClr val="accent1">
+                  <a:shade val="100000"/>
+                  <a:satMod val="115000"/>
+                </a:schemeClr>
+              </a:gs>
+            </a:gsLst>
+            <a:lin ang="0" scaled="1"/>
+            <a:tileRect/>
+          </a:gradFill>
+          <a:ln>
+            <a:noFill/>
+          </a:ln>
+          <a:effectLst>
+            <a:glow rad="63500">
+              <a:schemeClr val="accent1">
+                <a:satMod val="175000"/>
+                <a:alpha val="40000"/>
+              </a:schemeClr>
+            </a:glow>
+          </a:effectLst>
+        </p:spPr>
+        <p:style>
+          <a:lnRef idx="2">
+            <a:schemeClr val="accent1">
+              <a:shade val="50000"/>
+            </a:schemeClr>
+          </a:lnRef>
+          <a:fillRef idx="1">
+            <a:schemeClr val="accent1"/>
+          </a:fillRef>
+          <a:effectRef idx="0">
+            <a:schemeClr val="accent1"/>
+          </a:effectRef>
+          <a:fontRef idx="minor">
+            <a:schemeClr val="lt1"/>
+          </a:fontRef>
+        </p:style>
+        <p:txBody>
+          <a:bodyPr rtlCol="0" anchor="ctr"/>
+          <a:lstStyle/>
+          <a:p>
+            <a:pPr algn="ctr"/>
+            <a:r>
+              <a:rPr lang="en-US" sz="2000" noProof="1">
+                <a:solidFill>
+                  <a:schemeClr val="bg1"/>
+                </a:solidFill>
+              </a:rPr>
+              <a:t>ChargeItemDefinition</a:t>
+            </a:r>
+          </a:p>
+        </p:txBody>
+      </p:sp>
+      <p:sp>
+        <p:nvSpPr>
+          <p:cNvPr id="51" name="ZoneTexte 50">
+            <a:extLst>
+              <a:ext uri="{FF2B5EF4-FFF2-40B4-BE49-F238E27FC236}">
+                <a16:creationId xmlns:a16="http://schemas.microsoft.com/office/drawing/2014/main" id="{B432A0E3-37FB-43D6-AD1D-49E58D642501}"/>
+              </a:ext>
+            </a:extLst>
+          </p:cNvPr>
+          <p:cNvSpPr txBox="1"/>
+          <p:nvPr/>
+        </p:nvSpPr>
+        <p:spPr>
+          <a:xfrm>
+            <a:off x="2608567" y="4412675"/>
+            <a:ext cx="578339" cy="369332"/>
+          </a:xfrm>
+          <a:prstGeom prst="rect">
+            <a:avLst/>
+          </a:prstGeom>
+          <a:noFill/>
+        </p:spPr>
+        <p:txBody>
+          <a:bodyPr wrap="square" rtlCol="0">
+            <a:spAutoFit/>
+          </a:bodyPr>
+          <a:lstStyle/>
+          <a:p>
+            <a:r>
+              <a:rPr lang="en-US" noProof="1"/>
+              <a:t>0..*</a:t>
+            </a:r>
+          </a:p>
+        </p:txBody>
+      </p:sp>
+      <p:sp>
+        <p:nvSpPr>
+          <p:cNvPr id="52" name="ZoneTexte 51">
+            <a:extLst>
+              <a:ext uri="{FF2B5EF4-FFF2-40B4-BE49-F238E27FC236}">
+                <a16:creationId xmlns:a16="http://schemas.microsoft.com/office/drawing/2014/main" id="{2B606A26-93C1-4D3C-82E9-8BCA6914F050}"/>
+              </a:ext>
+            </a:extLst>
+          </p:cNvPr>
+          <p:cNvSpPr txBox="1"/>
+          <p:nvPr/>
+        </p:nvSpPr>
+        <p:spPr>
+          <a:xfrm>
+            <a:off x="2845067" y="4034851"/>
+            <a:ext cx="1737451" cy="369332"/>
+          </a:xfrm>
+          <a:prstGeom prst="rect">
+            <a:avLst/>
+          </a:prstGeom>
+          <a:noFill/>
+        </p:spPr>
+        <p:txBody>
+          <a:bodyPr wrap="square" rtlCol="0">
+            <a:spAutoFit/>
+          </a:bodyPr>
+          <a:lstStyle/>
+          <a:p>
+            <a:r>
+              <a:rPr lang="en-US" noProof="1">
+                <a:solidFill>
+                  <a:srgbClr val="0070C0"/>
+                </a:solidFill>
+              </a:rPr>
+              <a:t>Billing extension</a:t>
+            </a:r>
+          </a:p>
+        </p:txBody>
+      </p:sp>
+      <p:sp>
+        <p:nvSpPr>
+          <p:cNvPr id="56" name="Rectangle 55">
+            <a:extLst>
+              <a:ext uri="{FF2B5EF4-FFF2-40B4-BE49-F238E27FC236}">
+                <a16:creationId xmlns:a16="http://schemas.microsoft.com/office/drawing/2014/main" id="{83984D95-771F-4A70-B1FE-3A801BC9188F}"/>
+              </a:ext>
+            </a:extLst>
+          </p:cNvPr>
+          <p:cNvSpPr/>
+          <p:nvPr/>
+        </p:nvSpPr>
+        <p:spPr>
+          <a:xfrm>
+            <a:off x="366174" y="2438107"/>
+            <a:ext cx="1978492" cy="802183"/>
+          </a:xfrm>
+          <a:prstGeom prst="rect">
+            <a:avLst/>
+          </a:prstGeom>
+          <a:gradFill flip="none" rotWithShape="1">
+            <a:gsLst>
+              <a:gs pos="0">
+                <a:schemeClr val="accent1">
+                  <a:shade val="30000"/>
+                  <a:satMod val="115000"/>
+                </a:schemeClr>
+              </a:gs>
+              <a:gs pos="50000">
+                <a:schemeClr val="accent1">
+                  <a:shade val="67500"/>
+                  <a:satMod val="115000"/>
+                </a:schemeClr>
+              </a:gs>
+              <a:gs pos="100000">
+                <a:schemeClr val="accent1">
+                  <a:shade val="100000"/>
+                  <a:satMod val="115000"/>
+                </a:schemeClr>
+              </a:gs>
+            </a:gsLst>
+            <a:lin ang="0" scaled="1"/>
+            <a:tileRect/>
+          </a:gradFill>
+          <a:ln>
+            <a:noFill/>
+          </a:ln>
+          <a:effectLst>
+            <a:glow rad="63500">
+              <a:schemeClr val="accent1">
+                <a:satMod val="175000"/>
+                <a:alpha val="40000"/>
+              </a:schemeClr>
+            </a:glow>
+          </a:effectLst>
+        </p:spPr>
+        <p:style>
+          <a:lnRef idx="2">
+            <a:schemeClr val="accent1">
+              <a:shade val="50000"/>
+            </a:schemeClr>
+          </a:lnRef>
+          <a:fillRef idx="1">
+            <a:schemeClr val="accent1"/>
+          </a:fillRef>
+          <a:effectRef idx="0">
+            <a:schemeClr val="accent1"/>
+          </a:effectRef>
+          <a:fontRef idx="minor">
+            <a:schemeClr val="lt1"/>
+          </a:fontRef>
+        </p:style>
+        <p:txBody>
+          <a:bodyPr rtlCol="0" anchor="ctr"/>
+          <a:lstStyle/>
+          <a:p>
+            <a:pPr algn="ctr"/>
+            <a:r>
+              <a:rPr lang="en-US" sz="2000" noProof="1">
+                <a:solidFill>
+                  <a:schemeClr val="bg1"/>
+                </a:solidFill>
+              </a:rPr>
+              <a:t>PackagedProductDefinition</a:t>
+            </a:r>
+          </a:p>
+        </p:txBody>
+      </p:sp>
+      <p:cxnSp>
+        <p:nvCxnSpPr>
+          <p:cNvPr id="60" name="Connecteur : en angle 59">
+            <a:extLst>
+              <a:ext uri="{FF2B5EF4-FFF2-40B4-BE49-F238E27FC236}">
+                <a16:creationId xmlns:a16="http://schemas.microsoft.com/office/drawing/2014/main" id="{DBE3843E-86A8-4D8A-A479-211385544CFB}"/>
+              </a:ext>
+            </a:extLst>
+          </p:cNvPr>
+          <p:cNvCxnSpPr>
+            <a:cxnSpLocks/>
+            <a:stCxn id="11" idx="1"/>
+            <a:endCxn id="56" idx="2"/>
+          </p:cNvCxnSpPr>
+          <p:nvPr/>
+        </p:nvCxnSpPr>
+        <p:spPr>
+          <a:xfrm rot="10800000">
+            <a:off x="1355420" y="3240291"/>
+            <a:ext cx="3280502" cy="450187"/>
+          </a:xfrm>
+          <a:prstGeom prst="bentConnector2">
+            <a:avLst/>
+          </a:prstGeom>
+          <a:ln w="28575">
+            <a:headEnd type="arrow" w="med" len="med"/>
+            <a:tailEnd type="none" w="med" len="med"/>
+          </a:ln>
+        </p:spPr>
+        <p:style>
+          <a:lnRef idx="1">
+            <a:schemeClr val="accent1"/>
+          </a:lnRef>
+          <a:fillRef idx="0">
+            <a:schemeClr val="accent1"/>
+          </a:fillRef>
+          <a:effectRef idx="0">
+            <a:schemeClr val="accent1"/>
+          </a:effectRef>
+          <a:fontRef idx="minor">
+            <a:schemeClr val="tx1"/>
+          </a:fontRef>
+        </p:style>
+      </p:cxnSp>
+      <p:sp>
+        <p:nvSpPr>
+          <p:cNvPr id="17" name="Rectangle 16">
+            <a:extLst>
+              <a:ext uri="{FF2B5EF4-FFF2-40B4-BE49-F238E27FC236}">
+                <a16:creationId xmlns:a16="http://schemas.microsoft.com/office/drawing/2014/main" id="{E989523E-2435-438C-B1CA-FBD07084180E}"/>
+              </a:ext>
+            </a:extLst>
+          </p:cNvPr>
+          <p:cNvSpPr/>
+          <p:nvPr/>
+        </p:nvSpPr>
+        <p:spPr>
+          <a:xfrm>
+            <a:off x="4643485" y="3129286"/>
+            <a:ext cx="916868" cy="250017"/>
+          </a:xfrm>
+          <a:prstGeom prst="rect">
+            <a:avLst/>
+          </a:prstGeom>
+        </p:spPr>
+        <p:style>
+          <a:lnRef idx="2">
+            <a:schemeClr val="accent1">
+              <a:shade val="50000"/>
+            </a:schemeClr>
+          </a:lnRef>
+          <a:fillRef idx="1">
+            <a:schemeClr val="accent1"/>
+          </a:fillRef>
+          <a:effectRef idx="0">
+            <a:schemeClr val="accent1"/>
+          </a:effectRef>
+          <a:fontRef idx="minor">
+            <a:schemeClr val="lt1"/>
+          </a:fontRef>
+        </p:style>
+        <p:txBody>
+          <a:bodyPr rtlCol="0" anchor="ctr"/>
+          <a:lstStyle/>
+          <a:p>
+            <a:pPr algn="ctr"/>
+            <a:endParaRPr lang="fr-FR"/>
+          </a:p>
+        </p:txBody>
+      </p:sp>
+      <p:sp>
+        <p:nvSpPr>
+          <p:cNvPr id="11" name="Rectangle 10">
+            <a:extLst>
+              <a:ext uri="{FF2B5EF4-FFF2-40B4-BE49-F238E27FC236}">
+                <a16:creationId xmlns:a16="http://schemas.microsoft.com/office/drawing/2014/main" id="{E2B1908B-CC45-41BD-BE20-7F25C0BD8D17}"/>
+              </a:ext>
+            </a:extLst>
+          </p:cNvPr>
+          <p:cNvSpPr/>
+          <p:nvPr/>
+        </p:nvSpPr>
+        <p:spPr>
+          <a:xfrm>
+            <a:off x="4635922" y="3120206"/>
+            <a:ext cx="2776560" cy="1140542"/>
+          </a:xfrm>
+          <a:prstGeom prst="rect">
+            <a:avLst/>
+          </a:prstGeom>
+          <a:gradFill flip="none" rotWithShape="1">
+            <a:gsLst>
+              <a:gs pos="0">
+                <a:schemeClr val="accent1">
+                  <a:shade val="30000"/>
+                  <a:satMod val="115000"/>
+                </a:schemeClr>
+              </a:gs>
+              <a:gs pos="50000">
+                <a:schemeClr val="accent1">
+                  <a:shade val="67500"/>
+                  <a:satMod val="115000"/>
+                </a:schemeClr>
+              </a:gs>
+              <a:gs pos="100000">
+                <a:schemeClr val="accent1">
+                  <a:shade val="100000"/>
+                  <a:satMod val="115000"/>
+                </a:schemeClr>
+              </a:gs>
+            </a:gsLst>
+            <a:lin ang="0" scaled="1"/>
+            <a:tileRect/>
+          </a:gradFill>
+          <a:ln>
+            <a:noFill/>
+          </a:ln>
+          <a:effectLst>
+            <a:glow rad="63500">
+              <a:schemeClr val="accent1">
+                <a:satMod val="175000"/>
+                <a:alpha val="40000"/>
+              </a:schemeClr>
+            </a:glow>
+          </a:effectLst>
+        </p:spPr>
+        <p:style>
+          <a:lnRef idx="2">
+            <a:schemeClr val="accent1">
+              <a:shade val="50000"/>
+            </a:schemeClr>
+          </a:lnRef>
+          <a:fillRef idx="1">
+            <a:schemeClr val="accent1"/>
+          </a:fillRef>
+          <a:effectRef idx="0">
+            <a:schemeClr val="accent1"/>
+          </a:effectRef>
+          <a:fontRef idx="minor">
+            <a:schemeClr val="lt1"/>
+          </a:fontRef>
+        </p:style>
+        <p:txBody>
+          <a:bodyPr rtlCol="0" anchor="ctr"/>
+          <a:lstStyle/>
+          <a:p>
+            <a:pPr algn="ctr"/>
+            <a:r>
+              <a:rPr lang="en-US" sz="2000" noProof="1">
+                <a:solidFill>
+                  <a:schemeClr val="bg1"/>
+                </a:solidFill>
+              </a:rPr>
+              <a:t>MDD4Catalog</a:t>
+            </a:r>
+          </a:p>
+          <a:p>
+            <a:pPr algn="ctr"/>
+            <a:r>
+              <a:rPr lang="en-US" sz="2000" noProof="1">
                 <a:solidFill>
                   <a:schemeClr val="bg1"/>
                 </a:solidFill>
               </a:rPr>
               <a:t>Profile of DeviceDefinition</a:t>
+            </a:r>
+          </a:p>
+        </p:txBody>
+      </p:sp>
+      <p:sp>
+        <p:nvSpPr>
+          <p:cNvPr id="67" name="ZoneTexte 66">
+            <a:extLst>
+              <a:ext uri="{FF2B5EF4-FFF2-40B4-BE49-F238E27FC236}">
+                <a16:creationId xmlns:a16="http://schemas.microsoft.com/office/drawing/2014/main" id="{FA781BF2-8F55-456C-8277-C86579AC43D1}"/>
+              </a:ext>
+            </a:extLst>
+          </p:cNvPr>
+          <p:cNvSpPr txBox="1"/>
+          <p:nvPr/>
+        </p:nvSpPr>
+        <p:spPr>
+          <a:xfrm>
+            <a:off x="1413863" y="3351295"/>
+            <a:ext cx="2845128" cy="369332"/>
+          </a:xfrm>
+          <a:prstGeom prst="rect">
+            <a:avLst/>
+          </a:prstGeom>
+          <a:noFill/>
+        </p:spPr>
+        <p:txBody>
+          <a:bodyPr wrap="square" rtlCol="0">
+            <a:spAutoFit/>
+          </a:bodyPr>
+          <a:lstStyle/>
+          <a:p>
+            <a:r>
+              <a:rPr lang="en-US" noProof="1">
+                <a:solidFill>
+                  <a:srgbClr val="0070C0"/>
+                </a:solidFill>
+              </a:rPr>
+              <a:t>package.containedItem.item</a:t>
+            </a:r>
+          </a:p>
+        </p:txBody>
+      </p:sp>
+      <p:sp>
+        <p:nvSpPr>
+          <p:cNvPr id="71" name="ZoneTexte 70">
+            <a:extLst>
+              <a:ext uri="{FF2B5EF4-FFF2-40B4-BE49-F238E27FC236}">
+                <a16:creationId xmlns:a16="http://schemas.microsoft.com/office/drawing/2014/main" id="{AE23D196-8C9D-4D94-BB2F-CE84DC54F7C3}"/>
+              </a:ext>
+            </a:extLst>
+          </p:cNvPr>
+          <p:cNvSpPr txBox="1"/>
+          <p:nvPr/>
+        </p:nvSpPr>
+        <p:spPr>
+          <a:xfrm>
+            <a:off x="4158287" y="3348845"/>
+            <a:ext cx="578339" cy="369332"/>
+          </a:xfrm>
+          <a:prstGeom prst="rect">
+            <a:avLst/>
+          </a:prstGeom>
+          <a:noFill/>
+        </p:spPr>
+        <p:txBody>
+          <a:bodyPr wrap="square" rtlCol="0">
+            <a:spAutoFit/>
+          </a:bodyPr>
+          <a:lstStyle/>
+          <a:p>
+            <a:r>
+              <a:rPr lang="en-US" noProof="1"/>
+              <a:t>0..*</a:t>
             </a:r>
           </a:p>
         </p:txBody>

</xml_diff>

<commit_message>
Keep going with application of ballot comment dispositions
</commit_message>
<xml_diff>
--- a/input/images-source/DeviceCatalog.pptx
+++ b/input/images-source/DeviceCatalog.pptx
@@ -197,7 +197,7 @@
           <a:p>
             <a:fld id="{C0FC2EA5-DDD9-41B5-A743-573E81829967}" type="datetimeFigureOut">
               <a:rPr lang="fr-FR" smtClean="0"/>
-              <a:t>18/12/2020</a:t>
+              <a:t>19/12/2020</a:t>
             </a:fld>
             <a:endParaRPr lang="fr-FR"/>
           </a:p>
@@ -695,7 +695,7 @@
           <a:p>
             <a:fld id="{DEBA1CB3-45B4-4365-8A01-D60AF6EBF46C}" type="datetimeFigureOut">
               <a:rPr lang="fr-FR" smtClean="0"/>
-              <a:t>18/12/2020</a:t>
+              <a:t>19/12/2020</a:t>
             </a:fld>
             <a:endParaRPr lang="fr-FR"/>
           </a:p>
@@ -893,7 +893,7 @@
           <a:p>
             <a:fld id="{DEBA1CB3-45B4-4365-8A01-D60AF6EBF46C}" type="datetimeFigureOut">
               <a:rPr lang="fr-FR" smtClean="0"/>
-              <a:t>18/12/2020</a:t>
+              <a:t>19/12/2020</a:t>
             </a:fld>
             <a:endParaRPr lang="fr-FR"/>
           </a:p>
@@ -1101,7 +1101,7 @@
           <a:p>
             <a:fld id="{DEBA1CB3-45B4-4365-8A01-D60AF6EBF46C}" type="datetimeFigureOut">
               <a:rPr lang="fr-FR" smtClean="0"/>
-              <a:t>18/12/2020</a:t>
+              <a:t>19/12/2020</a:t>
             </a:fld>
             <a:endParaRPr lang="fr-FR"/>
           </a:p>
@@ -1299,7 +1299,7 @@
           <a:p>
             <a:fld id="{DEBA1CB3-45B4-4365-8A01-D60AF6EBF46C}" type="datetimeFigureOut">
               <a:rPr lang="fr-FR" smtClean="0"/>
-              <a:t>18/12/2020</a:t>
+              <a:t>19/12/2020</a:t>
             </a:fld>
             <a:endParaRPr lang="fr-FR"/>
           </a:p>
@@ -1574,7 +1574,7 @@
           <a:p>
             <a:fld id="{DEBA1CB3-45B4-4365-8A01-D60AF6EBF46C}" type="datetimeFigureOut">
               <a:rPr lang="fr-FR" smtClean="0"/>
-              <a:t>18/12/2020</a:t>
+              <a:t>19/12/2020</a:t>
             </a:fld>
             <a:endParaRPr lang="fr-FR"/>
           </a:p>
@@ -1839,7 +1839,7 @@
           <a:p>
             <a:fld id="{DEBA1CB3-45B4-4365-8A01-D60AF6EBF46C}" type="datetimeFigureOut">
               <a:rPr lang="fr-FR" smtClean="0"/>
-              <a:t>18/12/2020</a:t>
+              <a:t>19/12/2020</a:t>
             </a:fld>
             <a:endParaRPr lang="fr-FR"/>
           </a:p>
@@ -2251,7 +2251,7 @@
           <a:p>
             <a:fld id="{DEBA1CB3-45B4-4365-8A01-D60AF6EBF46C}" type="datetimeFigureOut">
               <a:rPr lang="fr-FR" smtClean="0"/>
-              <a:t>18/12/2020</a:t>
+              <a:t>19/12/2020</a:t>
             </a:fld>
             <a:endParaRPr lang="fr-FR"/>
           </a:p>
@@ -2392,7 +2392,7 @@
           <a:p>
             <a:fld id="{DEBA1CB3-45B4-4365-8A01-D60AF6EBF46C}" type="datetimeFigureOut">
               <a:rPr lang="fr-FR" smtClean="0"/>
-              <a:t>18/12/2020</a:t>
+              <a:t>19/12/2020</a:t>
             </a:fld>
             <a:endParaRPr lang="fr-FR"/>
           </a:p>
@@ -2505,7 +2505,7 @@
           <a:p>
             <a:fld id="{DEBA1CB3-45B4-4365-8A01-D60AF6EBF46C}" type="datetimeFigureOut">
               <a:rPr lang="fr-FR" smtClean="0"/>
-              <a:t>18/12/2020</a:t>
+              <a:t>19/12/2020</a:t>
             </a:fld>
             <a:endParaRPr lang="fr-FR"/>
           </a:p>
@@ -2816,7 +2816,7 @@
           <a:p>
             <a:fld id="{DEBA1CB3-45B4-4365-8A01-D60AF6EBF46C}" type="datetimeFigureOut">
               <a:rPr lang="fr-FR" smtClean="0"/>
-              <a:t>18/12/2020</a:t>
+              <a:t>19/12/2020</a:t>
             </a:fld>
             <a:endParaRPr lang="fr-FR"/>
           </a:p>
@@ -3104,7 +3104,7 @@
           <a:p>
             <a:fld id="{DEBA1CB3-45B4-4365-8A01-D60AF6EBF46C}" type="datetimeFigureOut">
               <a:rPr lang="fr-FR" smtClean="0"/>
-              <a:t>18/12/2020</a:t>
+              <a:t>19/12/2020</a:t>
             </a:fld>
             <a:endParaRPr lang="fr-FR"/>
           </a:p>
@@ -3345,7 +3345,7 @@
           <a:p>
             <a:fld id="{DEBA1CB3-45B4-4365-8A01-D60AF6EBF46C}" type="datetimeFigureOut">
               <a:rPr lang="fr-FR" smtClean="0"/>
-              <a:t>18/12/2020</a:t>
+              <a:t>19/12/2020</a:t>
             </a:fld>
             <a:endParaRPr lang="fr-FR"/>
           </a:p>
@@ -4639,7 +4639,7 @@
           </a:xfrm>
           <a:prstGeom prst="bentConnector3">
             <a:avLst>
-              <a:gd name="adj1" fmla="val 50000"/>
+              <a:gd name="adj1" fmla="val 73508"/>
             </a:avLst>
           </a:prstGeom>
           <a:ln w="19050">
@@ -5582,7 +5582,12 @@
             <a:tileRect/>
           </a:gradFill>
           <a:ln>
-            <a:noFill/>
+            <a:solidFill>
+              <a:schemeClr val="accent2">
+                <a:lumMod val="75000"/>
+              </a:schemeClr>
+            </a:solidFill>
+            <a:prstDash val="dash"/>
           </a:ln>
           <a:effectLst>
             <a:glow rad="63500">
@@ -5650,6 +5655,12 @@
             <a:avLst/>
           </a:prstGeom>
           <a:ln w="28575">
+            <a:solidFill>
+              <a:schemeClr val="accent2">
+                <a:lumMod val="75000"/>
+              </a:schemeClr>
+            </a:solidFill>
+            <a:prstDash val="dash"/>
             <a:headEnd type="arrow" w="med" len="med"/>
             <a:tailEnd type="none" w="med" len="med"/>
           </a:ln>
@@ -5884,6 +5895,47 @@
             <a:r>
               <a:rPr lang="en-US" noProof="1"/>
               <a:t>0..*</a:t>
+            </a:r>
+          </a:p>
+        </p:txBody>
+      </p:sp>
+      <p:sp>
+        <p:nvSpPr>
+          <p:cNvPr id="2" name="ZoneTexte 1">
+            <a:extLst>
+              <a:ext uri="{FF2B5EF4-FFF2-40B4-BE49-F238E27FC236}">
+                <a16:creationId xmlns:a16="http://schemas.microsoft.com/office/drawing/2014/main" id="{0F469C56-5A9B-44D6-8DC0-321DB1D0D50D}"/>
+              </a:ext>
+            </a:extLst>
+          </p:cNvPr>
+          <p:cNvSpPr txBox="1"/>
+          <p:nvPr/>
+        </p:nvSpPr>
+        <p:spPr>
+          <a:xfrm>
+            <a:off x="936228" y="3179916"/>
+            <a:ext cx="578339" cy="584775"/>
+          </a:xfrm>
+          <a:prstGeom prst="rect">
+            <a:avLst/>
+          </a:prstGeom>
+          <a:noFill/>
+        </p:spPr>
+        <p:txBody>
+          <a:bodyPr wrap="square" rtlCol="0">
+            <a:spAutoFit/>
+          </a:bodyPr>
+          <a:lstStyle/>
+          <a:p>
+            <a:r>
+              <a:rPr lang="fr-FR" sz="3200" dirty="0">
+                <a:solidFill>
+                  <a:schemeClr val="accent2">
+                    <a:lumMod val="75000"/>
+                  </a:schemeClr>
+                </a:solidFill>
+              </a:rPr>
+              <a:t>?</a:t>
             </a:r>
           </a:p>
         </p:txBody>

</xml_diff>

<commit_message>
Finalization of ballot comments resolution
</commit_message>
<xml_diff>
--- a/input/images-source/DeviceCatalog.pptx
+++ b/input/images-source/DeviceCatalog.pptx
@@ -197,7 +197,7 @@
           <a:p>
             <a:fld id="{C0FC2EA5-DDD9-41B5-A743-573E81829967}" type="datetimeFigureOut">
               <a:rPr lang="fr-FR" smtClean="0"/>
-              <a:t>19/12/2020</a:t>
+              <a:t>07/01/2021</a:t>
             </a:fld>
             <a:endParaRPr lang="fr-FR"/>
           </a:p>
@@ -695,7 +695,7 @@
           <a:p>
             <a:fld id="{DEBA1CB3-45B4-4365-8A01-D60AF6EBF46C}" type="datetimeFigureOut">
               <a:rPr lang="fr-FR" smtClean="0"/>
-              <a:t>19/12/2020</a:t>
+              <a:t>07/01/2021</a:t>
             </a:fld>
             <a:endParaRPr lang="fr-FR"/>
           </a:p>
@@ -893,7 +893,7 @@
           <a:p>
             <a:fld id="{DEBA1CB3-45B4-4365-8A01-D60AF6EBF46C}" type="datetimeFigureOut">
               <a:rPr lang="fr-FR" smtClean="0"/>
-              <a:t>19/12/2020</a:t>
+              <a:t>07/01/2021</a:t>
             </a:fld>
             <a:endParaRPr lang="fr-FR"/>
           </a:p>
@@ -1101,7 +1101,7 @@
           <a:p>
             <a:fld id="{DEBA1CB3-45B4-4365-8A01-D60AF6EBF46C}" type="datetimeFigureOut">
               <a:rPr lang="fr-FR" smtClean="0"/>
-              <a:t>19/12/2020</a:t>
+              <a:t>07/01/2021</a:t>
             </a:fld>
             <a:endParaRPr lang="fr-FR"/>
           </a:p>
@@ -1299,7 +1299,7 @@
           <a:p>
             <a:fld id="{DEBA1CB3-45B4-4365-8A01-D60AF6EBF46C}" type="datetimeFigureOut">
               <a:rPr lang="fr-FR" smtClean="0"/>
-              <a:t>19/12/2020</a:t>
+              <a:t>07/01/2021</a:t>
             </a:fld>
             <a:endParaRPr lang="fr-FR"/>
           </a:p>
@@ -1574,7 +1574,7 @@
           <a:p>
             <a:fld id="{DEBA1CB3-45B4-4365-8A01-D60AF6EBF46C}" type="datetimeFigureOut">
               <a:rPr lang="fr-FR" smtClean="0"/>
-              <a:t>19/12/2020</a:t>
+              <a:t>07/01/2021</a:t>
             </a:fld>
             <a:endParaRPr lang="fr-FR"/>
           </a:p>
@@ -1839,7 +1839,7 @@
           <a:p>
             <a:fld id="{DEBA1CB3-45B4-4365-8A01-D60AF6EBF46C}" type="datetimeFigureOut">
               <a:rPr lang="fr-FR" smtClean="0"/>
-              <a:t>19/12/2020</a:t>
+              <a:t>07/01/2021</a:t>
             </a:fld>
             <a:endParaRPr lang="fr-FR"/>
           </a:p>
@@ -2251,7 +2251,7 @@
           <a:p>
             <a:fld id="{DEBA1CB3-45B4-4365-8A01-D60AF6EBF46C}" type="datetimeFigureOut">
               <a:rPr lang="fr-FR" smtClean="0"/>
-              <a:t>19/12/2020</a:t>
+              <a:t>07/01/2021</a:t>
             </a:fld>
             <a:endParaRPr lang="fr-FR"/>
           </a:p>
@@ -2392,7 +2392,7 @@
           <a:p>
             <a:fld id="{DEBA1CB3-45B4-4365-8A01-D60AF6EBF46C}" type="datetimeFigureOut">
               <a:rPr lang="fr-FR" smtClean="0"/>
-              <a:t>19/12/2020</a:t>
+              <a:t>07/01/2021</a:t>
             </a:fld>
             <a:endParaRPr lang="fr-FR"/>
           </a:p>
@@ -2505,7 +2505,7 @@
           <a:p>
             <a:fld id="{DEBA1CB3-45B4-4365-8A01-D60AF6EBF46C}" type="datetimeFigureOut">
               <a:rPr lang="fr-FR" smtClean="0"/>
-              <a:t>19/12/2020</a:t>
+              <a:t>07/01/2021</a:t>
             </a:fld>
             <a:endParaRPr lang="fr-FR"/>
           </a:p>
@@ -2816,7 +2816,7 @@
           <a:p>
             <a:fld id="{DEBA1CB3-45B4-4365-8A01-D60AF6EBF46C}" type="datetimeFigureOut">
               <a:rPr lang="fr-FR" smtClean="0"/>
-              <a:t>19/12/2020</a:t>
+              <a:t>07/01/2021</a:t>
             </a:fld>
             <a:endParaRPr lang="fr-FR"/>
           </a:p>
@@ -3104,7 +3104,7 @@
           <a:p>
             <a:fld id="{DEBA1CB3-45B4-4365-8A01-D60AF6EBF46C}" type="datetimeFigureOut">
               <a:rPr lang="fr-FR" smtClean="0"/>
-              <a:t>19/12/2020</a:t>
+              <a:t>07/01/2021</a:t>
             </a:fld>
             <a:endParaRPr lang="fr-FR"/>
           </a:p>
@@ -3345,7 +3345,7 @@
           <a:p>
             <a:fld id="{DEBA1CB3-45B4-4365-8A01-D60AF6EBF46C}" type="datetimeFigureOut">
               <a:rPr lang="fr-FR" smtClean="0"/>
-              <a:t>19/12/2020</a:t>
+              <a:t>07/01/2021</a:t>
             </a:fld>
             <a:endParaRPr lang="fr-FR"/>
           </a:p>
@@ -4181,7 +4181,7 @@
         </p:nvSpPr>
         <p:spPr>
           <a:xfrm>
-            <a:off x="9708507" y="4478458"/>
+            <a:off x="8900126" y="4478458"/>
             <a:ext cx="1994629" cy="695103"/>
           </a:xfrm>
           <a:prstGeom prst="rect">
@@ -4274,7 +4274,7 @@
         <p:spPr>
           <a:xfrm>
             <a:off x="7404334" y="4079781"/>
-            <a:ext cx="3301488" cy="398677"/>
+            <a:ext cx="2493107" cy="398677"/>
           </a:xfrm>
           <a:prstGeom prst="bentConnector2">
             <a:avLst/>
@@ -4313,7 +4313,7 @@
         </p:nvSpPr>
         <p:spPr>
           <a:xfrm>
-            <a:off x="10742920" y="4052579"/>
+            <a:off x="9934539" y="4052579"/>
             <a:ext cx="578339" cy="369332"/>
           </a:xfrm>
           <a:prstGeom prst="rect">
@@ -5091,7 +5091,7 @@
         </p:nvSpPr>
         <p:spPr>
           <a:xfrm>
-            <a:off x="9956362" y="6038871"/>
+            <a:off x="9147981" y="6038871"/>
             <a:ext cx="1493515" cy="695103"/>
           </a:xfrm>
           <a:prstGeom prst="rect">
@@ -5183,7 +5183,7 @@
         </p:nvCxnSpPr>
         <p:spPr>
           <a:xfrm rot="5400000">
-            <a:off x="10271816" y="5604865"/>
+            <a:off x="9463435" y="5604865"/>
             <a:ext cx="865310" cy="2702"/>
           </a:xfrm>
           <a:prstGeom prst="bentConnector3">
@@ -5225,7 +5225,7 @@
         </p:nvSpPr>
         <p:spPr>
           <a:xfrm>
-            <a:off x="10693814" y="5173561"/>
+            <a:off x="9885433" y="5173561"/>
             <a:ext cx="1206345" cy="369332"/>
           </a:xfrm>
           <a:prstGeom prst="rect">
@@ -5264,7 +5264,7 @@
         </p:nvSpPr>
         <p:spPr>
           <a:xfrm>
-            <a:off x="10693814" y="5669539"/>
+            <a:off x="9885433" y="5669539"/>
             <a:ext cx="578339" cy="369332"/>
           </a:xfrm>
           <a:prstGeom prst="rect">
@@ -5539,149 +5539,6 @@
       </p:sp>
       <p:sp>
         <p:nvSpPr>
-          <p:cNvPr id="56" name="Rectangle 55">
-            <a:extLst>
-              <a:ext uri="{FF2B5EF4-FFF2-40B4-BE49-F238E27FC236}">
-                <a16:creationId xmlns:a16="http://schemas.microsoft.com/office/drawing/2014/main" id="{83984D95-771F-4A70-B1FE-3A801BC9188F}"/>
-              </a:ext>
-            </a:extLst>
-          </p:cNvPr>
-          <p:cNvSpPr/>
-          <p:nvPr/>
-        </p:nvSpPr>
-        <p:spPr>
-          <a:xfrm>
-            <a:off x="366174" y="2438107"/>
-            <a:ext cx="1978492" cy="802183"/>
-          </a:xfrm>
-          <a:prstGeom prst="rect">
-            <a:avLst/>
-          </a:prstGeom>
-          <a:gradFill flip="none" rotWithShape="1">
-            <a:gsLst>
-              <a:gs pos="0">
-                <a:schemeClr val="accent1">
-                  <a:shade val="30000"/>
-                  <a:satMod val="115000"/>
-                </a:schemeClr>
-              </a:gs>
-              <a:gs pos="50000">
-                <a:schemeClr val="accent1">
-                  <a:shade val="67500"/>
-                  <a:satMod val="115000"/>
-                </a:schemeClr>
-              </a:gs>
-              <a:gs pos="100000">
-                <a:schemeClr val="accent1">
-                  <a:shade val="100000"/>
-                  <a:satMod val="115000"/>
-                </a:schemeClr>
-              </a:gs>
-            </a:gsLst>
-            <a:lin ang="0" scaled="1"/>
-            <a:tileRect/>
-          </a:gradFill>
-          <a:ln>
-            <a:solidFill>
-              <a:schemeClr val="accent2">
-                <a:lumMod val="75000"/>
-              </a:schemeClr>
-            </a:solidFill>
-            <a:prstDash val="dash"/>
-          </a:ln>
-          <a:effectLst>
-            <a:glow rad="63500">
-              <a:schemeClr val="accent1">
-                <a:satMod val="175000"/>
-                <a:alpha val="40000"/>
-              </a:schemeClr>
-            </a:glow>
-          </a:effectLst>
-        </p:spPr>
-        <p:style>
-          <a:lnRef idx="2">
-            <a:schemeClr val="accent1">
-              <a:shade val="50000"/>
-            </a:schemeClr>
-          </a:lnRef>
-          <a:fillRef idx="1">
-            <a:schemeClr val="accent1"/>
-          </a:fillRef>
-          <a:effectRef idx="0">
-            <a:schemeClr val="accent1"/>
-          </a:effectRef>
-          <a:fontRef idx="minor">
-            <a:schemeClr val="lt1"/>
-          </a:fontRef>
-        </p:style>
-        <p:txBody>
-          <a:bodyPr rtlCol="0" anchor="ctr"/>
-          <a:lstStyle/>
-          <a:p>
-            <a:pPr algn="ctr"/>
-            <a:r>
-              <a:rPr lang="en-US" sz="2000" noProof="1">
-                <a:solidFill>
-                  <a:schemeClr val="bg1"/>
-                </a:solidFill>
-              </a:rPr>
-              <a:t>PackagedProductDefinition</a:t>
-            </a:r>
-          </a:p>
-        </p:txBody>
-      </p:sp>
-      <p:cxnSp>
-        <p:nvCxnSpPr>
-          <p:cNvPr id="60" name="Connecteur : en angle 59">
-            <a:extLst>
-              <a:ext uri="{FF2B5EF4-FFF2-40B4-BE49-F238E27FC236}">
-                <a16:creationId xmlns:a16="http://schemas.microsoft.com/office/drawing/2014/main" id="{DBE3843E-86A8-4D8A-A479-211385544CFB}"/>
-              </a:ext>
-            </a:extLst>
-          </p:cNvPr>
-          <p:cNvCxnSpPr>
-            <a:cxnSpLocks/>
-            <a:stCxn id="11" idx="1"/>
-            <a:endCxn id="56" idx="2"/>
-          </p:cNvCxnSpPr>
-          <p:nvPr/>
-        </p:nvCxnSpPr>
-        <p:spPr>
-          <a:xfrm rot="10800000">
-            <a:off x="1355420" y="3240291"/>
-            <a:ext cx="3280502" cy="450187"/>
-          </a:xfrm>
-          <a:prstGeom prst="bentConnector2">
-            <a:avLst/>
-          </a:prstGeom>
-          <a:ln w="28575">
-            <a:solidFill>
-              <a:schemeClr val="accent2">
-                <a:lumMod val="75000"/>
-              </a:schemeClr>
-            </a:solidFill>
-            <a:prstDash val="dash"/>
-            <a:headEnd type="arrow" w="med" len="med"/>
-            <a:tailEnd type="none" w="med" len="med"/>
-          </a:ln>
-        </p:spPr>
-        <p:style>
-          <a:lnRef idx="1">
-            <a:schemeClr val="accent1"/>
-          </a:lnRef>
-          <a:fillRef idx="0">
-            <a:schemeClr val="accent1"/>
-          </a:fillRef>
-          <a:effectRef idx="0">
-            <a:schemeClr val="accent1"/>
-          </a:effectRef>
-          <a:fontRef idx="minor">
-            <a:schemeClr val="tx1"/>
-          </a:fontRef>
-        </p:style>
-      </p:cxnSp>
-      <p:sp>
-        <p:nvSpPr>
           <p:cNvPr id="17" name="Rectangle 16">
             <a:extLst>
               <a:ext uri="{FF2B5EF4-FFF2-40B4-BE49-F238E27FC236}">
@@ -5821,121 +5678,6 @@
                 </a:solidFill>
               </a:rPr>
               <a:t>Profile of DeviceDefinition</a:t>
-            </a:r>
-          </a:p>
-        </p:txBody>
-      </p:sp>
-      <p:sp>
-        <p:nvSpPr>
-          <p:cNvPr id="67" name="ZoneTexte 66">
-            <a:extLst>
-              <a:ext uri="{FF2B5EF4-FFF2-40B4-BE49-F238E27FC236}">
-                <a16:creationId xmlns:a16="http://schemas.microsoft.com/office/drawing/2014/main" id="{FA781BF2-8F55-456C-8277-C86579AC43D1}"/>
-              </a:ext>
-            </a:extLst>
-          </p:cNvPr>
-          <p:cNvSpPr txBox="1"/>
-          <p:nvPr/>
-        </p:nvSpPr>
-        <p:spPr>
-          <a:xfrm>
-            <a:off x="1413863" y="3351295"/>
-            <a:ext cx="2845128" cy="369332"/>
-          </a:xfrm>
-          <a:prstGeom prst="rect">
-            <a:avLst/>
-          </a:prstGeom>
-          <a:noFill/>
-        </p:spPr>
-        <p:txBody>
-          <a:bodyPr wrap="square" rtlCol="0">
-            <a:spAutoFit/>
-          </a:bodyPr>
-          <a:lstStyle/>
-          <a:p>
-            <a:r>
-              <a:rPr lang="en-US" noProof="1">
-                <a:solidFill>
-                  <a:srgbClr val="0070C0"/>
-                </a:solidFill>
-              </a:rPr>
-              <a:t>package.containedItem.item</a:t>
-            </a:r>
-          </a:p>
-        </p:txBody>
-      </p:sp>
-      <p:sp>
-        <p:nvSpPr>
-          <p:cNvPr id="71" name="ZoneTexte 70">
-            <a:extLst>
-              <a:ext uri="{FF2B5EF4-FFF2-40B4-BE49-F238E27FC236}">
-                <a16:creationId xmlns:a16="http://schemas.microsoft.com/office/drawing/2014/main" id="{AE23D196-8C9D-4D94-BB2F-CE84DC54F7C3}"/>
-              </a:ext>
-            </a:extLst>
-          </p:cNvPr>
-          <p:cNvSpPr txBox="1"/>
-          <p:nvPr/>
-        </p:nvSpPr>
-        <p:spPr>
-          <a:xfrm>
-            <a:off x="4158287" y="3348845"/>
-            <a:ext cx="578339" cy="369332"/>
-          </a:xfrm>
-          <a:prstGeom prst="rect">
-            <a:avLst/>
-          </a:prstGeom>
-          <a:noFill/>
-        </p:spPr>
-        <p:txBody>
-          <a:bodyPr wrap="square" rtlCol="0">
-            <a:spAutoFit/>
-          </a:bodyPr>
-          <a:lstStyle/>
-          <a:p>
-            <a:r>
-              <a:rPr lang="en-US" noProof="1"/>
-              <a:t>0..*</a:t>
-            </a:r>
-          </a:p>
-        </p:txBody>
-      </p:sp>
-      <p:sp>
-        <p:nvSpPr>
-          <p:cNvPr id="2" name="ZoneTexte 1">
-            <a:extLst>
-              <a:ext uri="{FF2B5EF4-FFF2-40B4-BE49-F238E27FC236}">
-                <a16:creationId xmlns:a16="http://schemas.microsoft.com/office/drawing/2014/main" id="{0F469C56-5A9B-44D6-8DC0-321DB1D0D50D}"/>
-              </a:ext>
-            </a:extLst>
-          </p:cNvPr>
-          <p:cNvSpPr txBox="1"/>
-          <p:nvPr/>
-        </p:nvSpPr>
-        <p:spPr>
-          <a:xfrm>
-            <a:off x="936228" y="3179916"/>
-            <a:ext cx="578339" cy="584775"/>
-          </a:xfrm>
-          <a:prstGeom prst="rect">
-            <a:avLst/>
-          </a:prstGeom>
-          <a:noFill/>
-        </p:spPr>
-        <p:txBody>
-          <a:bodyPr wrap="square" rtlCol="0">
-            <a:spAutoFit/>
-          </a:bodyPr>
-          <a:lstStyle/>
-          <a:p>
-            <a:r>
-              <a:rPr lang="fr-FR" sz="3200" dirty="0">
-                <a:solidFill>
-                  <a:schemeClr val="accent2">
-                    <a:lumMod val="75000"/>
-                  </a:schemeClr>
-                </a:solidFill>
-              </a:rPr>
-              <a:t>?</a:t>
             </a:r>
           </a:p>
         </p:txBody>

</xml_diff>

<commit_message>
typo in home page
</commit_message>
<xml_diff>
--- a/input/images-source/DeviceCatalog.pptx
+++ b/input/images-source/DeviceCatalog.pptx
@@ -197,7 +197,7 @@
           <a:p>
             <a:fld id="{C0FC2EA5-DDD9-41B5-A743-573E81829967}" type="datetimeFigureOut">
               <a:rPr lang="fr-FR" smtClean="0"/>
-              <a:t>07/01/2021</a:t>
+              <a:t>08/01/2021</a:t>
             </a:fld>
             <a:endParaRPr lang="fr-FR"/>
           </a:p>
@@ -695,7 +695,7 @@
           <a:p>
             <a:fld id="{DEBA1CB3-45B4-4365-8A01-D60AF6EBF46C}" type="datetimeFigureOut">
               <a:rPr lang="fr-FR" smtClean="0"/>
-              <a:t>07/01/2021</a:t>
+              <a:t>08/01/2021</a:t>
             </a:fld>
             <a:endParaRPr lang="fr-FR"/>
           </a:p>
@@ -893,7 +893,7 @@
           <a:p>
             <a:fld id="{DEBA1CB3-45B4-4365-8A01-D60AF6EBF46C}" type="datetimeFigureOut">
               <a:rPr lang="fr-FR" smtClean="0"/>
-              <a:t>07/01/2021</a:t>
+              <a:t>08/01/2021</a:t>
             </a:fld>
             <a:endParaRPr lang="fr-FR"/>
           </a:p>
@@ -1101,7 +1101,7 @@
           <a:p>
             <a:fld id="{DEBA1CB3-45B4-4365-8A01-D60AF6EBF46C}" type="datetimeFigureOut">
               <a:rPr lang="fr-FR" smtClean="0"/>
-              <a:t>07/01/2021</a:t>
+              <a:t>08/01/2021</a:t>
             </a:fld>
             <a:endParaRPr lang="fr-FR"/>
           </a:p>
@@ -1299,7 +1299,7 @@
           <a:p>
             <a:fld id="{DEBA1CB3-45B4-4365-8A01-D60AF6EBF46C}" type="datetimeFigureOut">
               <a:rPr lang="fr-FR" smtClean="0"/>
-              <a:t>07/01/2021</a:t>
+              <a:t>08/01/2021</a:t>
             </a:fld>
             <a:endParaRPr lang="fr-FR"/>
           </a:p>
@@ -1574,7 +1574,7 @@
           <a:p>
             <a:fld id="{DEBA1CB3-45B4-4365-8A01-D60AF6EBF46C}" type="datetimeFigureOut">
               <a:rPr lang="fr-FR" smtClean="0"/>
-              <a:t>07/01/2021</a:t>
+              <a:t>08/01/2021</a:t>
             </a:fld>
             <a:endParaRPr lang="fr-FR"/>
           </a:p>
@@ -1839,7 +1839,7 @@
           <a:p>
             <a:fld id="{DEBA1CB3-45B4-4365-8A01-D60AF6EBF46C}" type="datetimeFigureOut">
               <a:rPr lang="fr-FR" smtClean="0"/>
-              <a:t>07/01/2021</a:t>
+              <a:t>08/01/2021</a:t>
             </a:fld>
             <a:endParaRPr lang="fr-FR"/>
           </a:p>
@@ -2251,7 +2251,7 @@
           <a:p>
             <a:fld id="{DEBA1CB3-45B4-4365-8A01-D60AF6EBF46C}" type="datetimeFigureOut">
               <a:rPr lang="fr-FR" smtClean="0"/>
-              <a:t>07/01/2021</a:t>
+              <a:t>08/01/2021</a:t>
             </a:fld>
             <a:endParaRPr lang="fr-FR"/>
           </a:p>
@@ -2392,7 +2392,7 @@
           <a:p>
             <a:fld id="{DEBA1CB3-45B4-4365-8A01-D60AF6EBF46C}" type="datetimeFigureOut">
               <a:rPr lang="fr-FR" smtClean="0"/>
-              <a:t>07/01/2021</a:t>
+              <a:t>08/01/2021</a:t>
             </a:fld>
             <a:endParaRPr lang="fr-FR"/>
           </a:p>
@@ -2505,7 +2505,7 @@
           <a:p>
             <a:fld id="{DEBA1CB3-45B4-4365-8A01-D60AF6EBF46C}" type="datetimeFigureOut">
               <a:rPr lang="fr-FR" smtClean="0"/>
-              <a:t>07/01/2021</a:t>
+              <a:t>08/01/2021</a:t>
             </a:fld>
             <a:endParaRPr lang="fr-FR"/>
           </a:p>
@@ -2816,7 +2816,7 @@
           <a:p>
             <a:fld id="{DEBA1CB3-45B4-4365-8A01-D60AF6EBF46C}" type="datetimeFigureOut">
               <a:rPr lang="fr-FR" smtClean="0"/>
-              <a:t>07/01/2021</a:t>
+              <a:t>08/01/2021</a:t>
             </a:fld>
             <a:endParaRPr lang="fr-FR"/>
           </a:p>
@@ -3104,7 +3104,7 @@
           <a:p>
             <a:fld id="{DEBA1CB3-45B4-4365-8A01-D60AF6EBF46C}" type="datetimeFigureOut">
               <a:rPr lang="fr-FR" smtClean="0"/>
-              <a:t>07/01/2021</a:t>
+              <a:t>08/01/2021</a:t>
             </a:fld>
             <a:endParaRPr lang="fr-FR"/>
           </a:p>
@@ -3345,7 +3345,7 @@
           <a:p>
             <a:fld id="{DEBA1CB3-45B4-4365-8A01-D60AF6EBF46C}" type="datetimeFigureOut">
               <a:rPr lang="fr-FR" smtClean="0"/>
-              <a:t>07/01/2021</a:t>
+              <a:t>08/01/2021</a:t>
             </a:fld>
             <a:endParaRPr lang="fr-FR"/>
           </a:p>
@@ -3776,8 +3776,8 @@
         </p:nvSpPr>
         <p:spPr>
           <a:xfrm>
-            <a:off x="5145945" y="2496238"/>
-            <a:ext cx="1428357" cy="646331"/>
+            <a:off x="5251623" y="2476034"/>
+            <a:ext cx="1604093" cy="646331"/>
           </a:xfrm>
           <a:prstGeom prst="rect">
             <a:avLst/>
@@ -3811,7 +3811,7 @@
                   <a:schemeClr val="tx1"/>
                 </a:solidFill>
               </a:rPr>
-              <a:t>A medical device</a:t>
+              <a:t>A model of medical device</a:t>
             </a:r>
           </a:p>
         </p:txBody>
@@ -4076,13 +4076,38 @@
           <a:lstStyle/>
           <a:p>
             <a:r>
-              <a:rPr lang="en-US" noProof="1"/>
+              <a:rPr lang="en-US" strike="sngStrike" noProof="1">
+                <a:solidFill>
+                  <a:srgbClr val="FF0000"/>
+                </a:solidFill>
+              </a:rPr>
               <a:t>parentDevice </a:t>
             </a:r>
             <a:r>
+              <a:rPr lang="en-US" i="1" strike="sngStrike" noProof="1">
+                <a:solidFill>
+                  <a:srgbClr val="FF0000"/>
+                </a:solidFill>
+              </a:rPr>
+              <a:t>(is part of)</a:t>
+            </a:r>
+            <a:r>
               <a:rPr lang="en-US" i="1" noProof="1"/>
-              <a:t>(is part of)</a:t>
-            </a:r>
+              <a:t> </a:t>
+            </a:r>
+            <a:r>
+              <a:rPr lang="en-US" i="1" noProof="1">
+                <a:solidFill>
+                  <a:srgbClr val="00B050"/>
+                </a:solidFill>
+              </a:rPr>
+              <a:t>hasPart</a:t>
+            </a:r>
+            <a:endParaRPr lang="en-US" i="1" strike="sngStrike" noProof="1">
+              <a:solidFill>
+                <a:srgbClr val="00B050"/>
+              </a:solidFill>
+            </a:endParaRPr>
           </a:p>
         </p:txBody>
       </p:sp>
@@ -4936,7 +4961,7 @@
         </p:nvSpPr>
         <p:spPr>
           <a:xfrm>
-            <a:off x="6446519" y="2777973"/>
+            <a:off x="6883291" y="2581017"/>
             <a:ext cx="610436" cy="369332"/>
           </a:xfrm>
           <a:prstGeom prst="rect">
@@ -5349,8 +5374,8 @@
         </p:nvCxnSpPr>
         <p:spPr>
           <a:xfrm rot="10800000" flipV="1">
-            <a:off x="2585553" y="4087780"/>
-            <a:ext cx="2057932" cy="692048"/>
+            <a:off x="2351313" y="4087780"/>
+            <a:ext cx="2292173" cy="440260"/>
           </a:xfrm>
           <a:prstGeom prst="bentConnector2">
             <a:avLst/>
@@ -5389,8 +5414,8 @@
         </p:nvSpPr>
         <p:spPr>
           <a:xfrm>
-            <a:off x="1828800" y="4779828"/>
-            <a:ext cx="1513505" cy="792704"/>
+            <a:off x="1131159" y="4528040"/>
+            <a:ext cx="2440305" cy="792704"/>
           </a:xfrm>
           <a:prstGeom prst="rect">
             <a:avLst/>
@@ -5477,7 +5502,7 @@
         </p:nvSpPr>
         <p:spPr>
           <a:xfrm>
-            <a:off x="2608567" y="4412675"/>
+            <a:off x="2309020" y="4179990"/>
             <a:ext cx="578339" cy="369332"/>
           </a:xfrm>
           <a:prstGeom prst="rect">

</xml_diff>